<commit_message>
Fixed PDF generation issue
</commit_message>
<xml_diff>
--- a/02-get_started+syntax/d-conditionals.pptx
+++ b/02-get_started+syntax/d-conditionals.pptx
@@ -384,7 +384,7 @@
             <a:pPr indent="0" algn="r">
               <a:buNone/>
             </a:pPr>
-            <a:fld id="{BB1928F1-7C4F-4D1E-8529-FE1A2CA87105}" type="slidenum">
+            <a:fld id="{43D17B19-E7FC-4701-AAF8-0D2041A6D18C}" type="slidenum">
               <a:rPr b="0" lang="en-GB" sz="1400" strike="noStrike" u="none">
                 <a:solidFill>
                   <a:srgbClr val="000000"/>
@@ -440,7 +440,7 @@
         <p:spPr>
           <a:xfrm>
             <a:off x="685800" y="1143000"/>
-            <a:ext cx="5482080" cy="3081960"/>
+            <a:ext cx="5481720" cy="3081600"/>
           </a:xfrm>
           <a:prstGeom prst="rect">
             <a:avLst/>
@@ -463,7 +463,7 @@
         <p:spPr>
           <a:xfrm>
             <a:off x="685800" y="4400640"/>
-            <a:ext cx="5482080" cy="3596040"/>
+            <a:ext cx="5481720" cy="3595680"/>
           </a:xfrm>
           <a:prstGeom prst="rect">
             <a:avLst/>
@@ -500,7 +500,7 @@
         <p:spPr>
           <a:xfrm>
             <a:off x="3884760" y="8685360"/>
-            <a:ext cx="2967480" cy="454320"/>
+            <a:ext cx="2967120" cy="453960"/>
           </a:xfrm>
           <a:prstGeom prst="rect">
             <a:avLst/>
@@ -526,7 +526,7 @@
                 <a:spcPct val="100000"/>
               </a:lnSpc>
             </a:pPr>
-            <a:fld id="{76B55535-278F-4CE7-8EC1-381C2BD0D19B}" type="slidenum">
+            <a:fld id="{7DB5919D-61F9-4F7D-B59C-295C05AB5433}" type="slidenum">
               <a:rPr b="0" lang="en-US" sz="1200" strike="noStrike" u="none">
                 <a:solidFill>
                   <a:srgbClr val="000000"/>
@@ -582,7 +582,7 @@
         <p:spPr>
           <a:xfrm>
             <a:off x="685800" y="1143000"/>
-            <a:ext cx="5482080" cy="3081960"/>
+            <a:ext cx="5481720" cy="3081600"/>
           </a:xfrm>
           <a:prstGeom prst="rect">
             <a:avLst/>
@@ -605,7 +605,7 @@
         <p:spPr>
           <a:xfrm>
             <a:off x="685800" y="4400640"/>
-            <a:ext cx="5482080" cy="3596040"/>
+            <a:ext cx="5481720" cy="3595680"/>
           </a:xfrm>
           <a:prstGeom prst="rect">
             <a:avLst/>
@@ -642,7 +642,7 @@
         <p:spPr>
           <a:xfrm>
             <a:off x="3884760" y="8685360"/>
-            <a:ext cx="2967480" cy="454320"/>
+            <a:ext cx="2967120" cy="453960"/>
           </a:xfrm>
           <a:prstGeom prst="rect">
             <a:avLst/>
@@ -668,7 +668,7 @@
                 <a:spcPct val="100000"/>
               </a:lnSpc>
             </a:pPr>
-            <a:fld id="{20364282-91FB-469C-A2C6-2A95BA4AC373}" type="slidenum">
+            <a:fld id="{0A551F35-90AF-4960-9050-E5BA83A8FBC1}" type="slidenum">
               <a:rPr b="0" lang="en-US" sz="1200" strike="noStrike" u="none">
                 <a:solidFill>
                   <a:srgbClr val="000000"/>
@@ -15030,7 +15030,7 @@
         <p:spPr>
           <a:xfrm>
             <a:off x="1139400" y="2784960"/>
-            <a:ext cx="10521720" cy="2383200"/>
+            <a:ext cx="10521360" cy="2382840"/>
           </a:xfrm>
           <a:prstGeom prst="rect">
             <a:avLst/>
@@ -15092,7 +15092,7 @@
         <p:spPr>
           <a:xfrm>
             <a:off x="0" y="0"/>
-            <a:ext cx="12187800" cy="3414240"/>
+            <a:ext cx="12187440" cy="3413880"/>
           </a:xfrm>
           <a:prstGeom prst="rect">
             <a:avLst/>
@@ -15152,7 +15152,7 @@
         <p:spPr>
           <a:xfrm>
             <a:off x="7646400" y="9360"/>
-            <a:ext cx="4541400" cy="3404880"/>
+            <a:ext cx="4541040" cy="3404520"/>
           </a:xfrm>
           <a:prstGeom prst="rect">
             <a:avLst/>
@@ -15201,7 +15201,7 @@
         <p:spPr>
           <a:xfrm>
             <a:off x="838080" y="365040"/>
-            <a:ext cx="10511280" cy="1321200"/>
+            <a:ext cx="10510920" cy="1320840"/>
           </a:xfrm>
           <a:prstGeom prst="rect">
             <a:avLst/>
@@ -15257,7 +15257,7 @@
         <p:spPr>
           <a:xfrm>
             <a:off x="838080" y="1825560"/>
-            <a:ext cx="10511280" cy="4347000"/>
+            <a:ext cx="10510920" cy="4346640"/>
           </a:xfrm>
           <a:prstGeom prst="rect">
             <a:avLst/>
@@ -16530,7 +16530,7 @@
         <p:spPr>
           <a:xfrm>
             <a:off x="82080" y="1213560"/>
-            <a:ext cx="5856840" cy="5445360"/>
+            <a:ext cx="5856480" cy="5445000"/>
           </a:xfrm>
           <a:prstGeom prst="rect">
             <a:avLst/>
@@ -16716,7 +16716,7 @@
         <p:spPr>
           <a:xfrm>
             <a:off x="6091200" y="36000"/>
-            <a:ext cx="6091560" cy="6853680"/>
+            <a:ext cx="6091200" cy="6853320"/>
           </a:xfrm>
           <a:prstGeom prst="rect">
             <a:avLst/>
@@ -16772,7 +16772,7 @@
         <p:spPr>
           <a:xfrm>
             <a:off x="6012000" y="3895560"/>
-            <a:ext cx="5974920" cy="2619720"/>
+            <a:ext cx="5974560" cy="2619720"/>
           </a:xfrm>
           <a:prstGeom prst="rect">
             <a:avLst/>
@@ -16994,7 +16994,7 @@
         <p:spPr>
           <a:xfrm>
             <a:off x="-61920" y="41040"/>
-            <a:ext cx="10511280" cy="1321200"/>
+            <a:ext cx="10510920" cy="1320840"/>
           </a:xfrm>
           <a:prstGeom prst="rect">
             <a:avLst/>
@@ -17100,7 +17100,7 @@
         <p:spPr>
           <a:xfrm>
             <a:off x="7554600" y="286200"/>
-            <a:ext cx="4473720" cy="3943080"/>
+            <a:ext cx="4473360" cy="3942720"/>
           </a:xfrm>
           <a:prstGeom prst="rect">
             <a:avLst/>
@@ -17164,7 +17164,7 @@
         <p:spPr>
           <a:xfrm>
             <a:off x="9115560" y="777600"/>
-            <a:ext cx="150120" cy="140400"/>
+            <a:ext cx="149760" cy="140040"/>
           </a:xfrm>
           <a:prstGeom prst="ellipse">
             <a:avLst/>
@@ -17222,15 +17222,15 @@
         <p:spPr>
           <a:xfrm>
             <a:off x="9191880" y="921600"/>
-            <a:ext cx="1440" cy="393480"/>
+            <a:ext cx="1080" cy="393120"/>
           </a:xfrm>
           <a:custGeom>
             <a:avLst/>
             <a:gdLst>
-              <a:gd name="textAreaLeft" fmla="*/ 0 w 1440"/>
-              <a:gd name="textAreaRight" fmla="*/ 3960 w 1440"/>
-              <a:gd name="textAreaTop" fmla="*/ 0 h 393480"/>
-              <a:gd name="textAreaBottom" fmla="*/ 395640 h 393480"/>
+              <a:gd name="textAreaLeft" fmla="*/ 0 w 1080"/>
+              <a:gd name="textAreaRight" fmla="*/ 3960 w 1080"/>
+              <a:gd name="textAreaTop" fmla="*/ 0 h 393120"/>
+              <a:gd name="textAreaBottom" fmla="*/ 395640 h 393120"/>
             </a:gdLst>
             <a:ahLst/>
             <a:rect l="textAreaLeft" t="textAreaTop" r="textAreaRight" b="textAreaBottom"/>
@@ -17295,7 +17295,7 @@
         <p:spPr>
           <a:xfrm>
             <a:off x="8123040" y="1163520"/>
-            <a:ext cx="2146680" cy="882360"/>
+            <a:ext cx="2146320" cy="882000"/>
           </a:xfrm>
           <a:prstGeom prst="diamond">
             <a:avLst/>
@@ -17377,7 +17377,7 @@
         <p:spPr>
           <a:xfrm>
             <a:off x="7020000" y="2453400"/>
-            <a:ext cx="1238760" cy="537840"/>
+            <a:ext cx="1238400" cy="537480"/>
           </a:xfrm>
           <a:prstGeom prst="roundRect">
             <a:avLst>
@@ -17449,8 +17449,8 @@
         </p:nvSpPr>
         <p:spPr>
           <a:xfrm flipV="1" rot="10800000">
-            <a:off x="7644600" y="1606680"/>
-            <a:ext cx="478440" cy="843840"/>
+            <a:off x="7644960" y="1606320"/>
+            <a:ext cx="478080" cy="843480"/>
           </a:xfrm>
           <a:prstGeom prst="bentConnector2">
             <a:avLst/>
@@ -17505,7 +17505,7 @@
         <p:spPr>
           <a:xfrm>
             <a:off x="10273320" y="1606320"/>
-            <a:ext cx="372240" cy="843840"/>
+            <a:ext cx="371880" cy="843480"/>
           </a:xfrm>
           <a:prstGeom prst="bentConnector2">
             <a:avLst/>
@@ -17560,7 +17560,7 @@
         <p:spPr>
           <a:xfrm>
             <a:off x="8899560" y="3868560"/>
-            <a:ext cx="282960" cy="262800"/>
+            <a:ext cx="282600" cy="262440"/>
           </a:xfrm>
           <a:prstGeom prst="ellipse">
             <a:avLst/>
@@ -17618,7 +17618,7 @@
         <p:spPr>
           <a:xfrm>
             <a:off x="8968680" y="3937680"/>
-            <a:ext cx="144720" cy="124560"/>
+            <a:ext cx="144360" cy="124200"/>
           </a:xfrm>
           <a:prstGeom prst="ellipse">
             <a:avLst/>
@@ -17675,8 +17675,8 @@
         </p:nvSpPr>
         <p:spPr>
           <a:xfrm flipH="1" rot="16200000">
-            <a:off x="7766640" y="2868840"/>
-            <a:ext cx="1004040" cy="1255320"/>
+            <a:off x="7767000" y="2868840"/>
+            <a:ext cx="1003680" cy="1254960"/>
           </a:xfrm>
           <a:prstGeom prst="bentConnector2">
             <a:avLst/>
@@ -17843,7 +17843,7 @@
         <p:spPr>
           <a:xfrm>
             <a:off x="10027800" y="2453400"/>
-            <a:ext cx="1238400" cy="537840"/>
+            <a:ext cx="1238040" cy="537480"/>
           </a:xfrm>
           <a:prstGeom prst="roundRect">
             <a:avLst>
@@ -17915,8 +17915,8 @@
         </p:nvSpPr>
         <p:spPr>
           <a:xfrm rot="5400000">
-            <a:off x="9416520" y="2766960"/>
-            <a:ext cx="1004040" cy="1459080"/>
+            <a:off x="9416880" y="2766960"/>
+            <a:ext cx="1003680" cy="1458720"/>
           </a:xfrm>
           <a:prstGeom prst="bentConnector2">
             <a:avLst/>
@@ -17971,7 +17971,7 @@
         <p:spPr>
           <a:xfrm>
             <a:off x="8510400" y="625680"/>
-            <a:ext cx="509760" cy="394560"/>
+            <a:ext cx="509400" cy="394560"/>
           </a:xfrm>
           <a:prstGeom prst="rect">
             <a:avLst/>
@@ -18400,7 +18400,7 @@
         <p:spPr>
           <a:xfrm>
             <a:off x="838080" y="1825560"/>
-            <a:ext cx="5253480" cy="4347000"/>
+            <a:ext cx="5253120" cy="4346640"/>
           </a:xfrm>
           <a:prstGeom prst="rect">
             <a:avLst/>
@@ -18705,7 +18705,7 @@
         <p:spPr>
           <a:xfrm>
             <a:off x="6091200" y="0"/>
-            <a:ext cx="6091560" cy="6853680"/>
+            <a:ext cx="6091200" cy="6853320"/>
           </a:xfrm>
           <a:prstGeom prst="rect">
             <a:avLst/>
@@ -18761,7 +18761,7 @@
         <p:spPr>
           <a:xfrm>
             <a:off x="6111000" y="2167560"/>
-            <a:ext cx="6071760" cy="2498040"/>
+            <a:ext cx="6071400" cy="2498040"/>
           </a:xfrm>
           <a:prstGeom prst="rect">
             <a:avLst/>
@@ -18949,7 +18949,7 @@
         <p:spPr>
           <a:xfrm>
             <a:off x="838080" y="365040"/>
-            <a:ext cx="10511280" cy="1321200"/>
+            <a:ext cx="10510920" cy="1320840"/>
           </a:xfrm>
           <a:prstGeom prst="rect">
             <a:avLst/>
@@ -20118,7 +20118,7 @@
         <p:spPr>
           <a:xfrm>
             <a:off x="838080" y="1825560"/>
-            <a:ext cx="5253480" cy="4347000"/>
+            <a:ext cx="5253120" cy="4346640"/>
           </a:xfrm>
           <a:prstGeom prst="rect">
             <a:avLst/>
@@ -20343,7 +20343,7 @@
         <p:spPr>
           <a:xfrm>
             <a:off x="4538520" y="0"/>
-            <a:ext cx="7644240" cy="6853680"/>
+            <a:ext cx="7643880" cy="6853320"/>
           </a:xfrm>
           <a:prstGeom prst="rect">
             <a:avLst/>
@@ -20399,7 +20399,7 @@
         <p:spPr>
           <a:xfrm>
             <a:off x="4638600" y="2167560"/>
-            <a:ext cx="7544160" cy="2284200"/>
+            <a:ext cx="7543800" cy="2284200"/>
           </a:xfrm>
           <a:prstGeom prst="rect">
             <a:avLst/>
@@ -20558,7 +20558,7 @@
         <p:spPr>
           <a:xfrm>
             <a:off x="838080" y="365040"/>
-            <a:ext cx="10511280" cy="1321200"/>
+            <a:ext cx="10510920" cy="1320840"/>
           </a:xfrm>
           <a:prstGeom prst="rect">
             <a:avLst/>
@@ -21276,7 +21276,7 @@
         <p:spPr>
           <a:xfrm>
             <a:off x="838080" y="1825560"/>
-            <a:ext cx="5253480" cy="4347000"/>
+            <a:ext cx="5253120" cy="4346640"/>
           </a:xfrm>
           <a:prstGeom prst="rect">
             <a:avLst/>
@@ -21580,7 +21580,7 @@
         <p:spPr>
           <a:xfrm>
             <a:off x="5214960" y="0"/>
-            <a:ext cx="6967800" cy="6853680"/>
+            <a:ext cx="6967440" cy="6853320"/>
           </a:xfrm>
           <a:prstGeom prst="rect">
             <a:avLst/>
@@ -21636,7 +21636,7 @@
         <p:spPr>
           <a:xfrm>
             <a:off x="5746680" y="234720"/>
-            <a:ext cx="5904000" cy="3015720"/>
+            <a:ext cx="5903640" cy="3015720"/>
           </a:xfrm>
           <a:prstGeom prst="rect">
             <a:avLst/>
@@ -21856,7 +21856,7 @@
         <p:spPr>
           <a:xfrm>
             <a:off x="82080" y="221040"/>
-            <a:ext cx="10511280" cy="1321200"/>
+            <a:ext cx="10510920" cy="1320840"/>
           </a:xfrm>
           <a:prstGeom prst="rect">
             <a:avLst/>
@@ -21912,7 +21912,7 @@
         <p:spPr>
           <a:xfrm>
             <a:off x="5816880" y="3688560"/>
-            <a:ext cx="5899320" cy="3015720"/>
+            <a:ext cx="5898960" cy="3015720"/>
           </a:xfrm>
           <a:prstGeom prst="rect">
             <a:avLst/>
@@ -23094,7 +23094,7 @@
         <p:spPr>
           <a:xfrm>
             <a:off x="838080" y="365040"/>
-            <a:ext cx="10511280" cy="1321200"/>
+            <a:ext cx="10510920" cy="1320840"/>
           </a:xfrm>
           <a:prstGeom prst="rect">
             <a:avLst/>
@@ -23150,7 +23150,7 @@
         <p:spPr>
           <a:xfrm>
             <a:off x="838080" y="1825560"/>
-            <a:ext cx="10511280" cy="4347000"/>
+            <a:ext cx="10510920" cy="4346640"/>
           </a:xfrm>
           <a:prstGeom prst="rect">
             <a:avLst/>
@@ -23443,9 +23443,9 @@
         <p:grpSpPr>
           <a:xfrm>
             <a:off x="9411480" y="0"/>
-            <a:ext cx="2775960" cy="6853680"/>
+            <a:ext cx="2775600" cy="6853320"/>
             <a:chOff x="9411480" y="0"/>
-            <a:chExt cx="2775960" cy="6853680"/>
+            <a:chExt cx="2775600" cy="6853320"/>
           </a:xfrm>
         </p:grpSpPr>
         <p:sp>
@@ -23457,7 +23457,7 @@
           <p:spPr>
             <a:xfrm>
               <a:off x="9411480" y="0"/>
-              <a:ext cx="2775960" cy="6853680"/>
+              <a:ext cx="2775600" cy="6853320"/>
             </a:xfrm>
             <a:prstGeom prst="rect">
               <a:avLst/>
@@ -23519,7 +23519,7 @@
           <p:spPr>
             <a:xfrm>
               <a:off x="10071720" y="412200"/>
-              <a:ext cx="1652760" cy="1599840"/>
+              <a:ext cx="1652400" cy="1599480"/>
             </a:xfrm>
             <a:prstGeom prst="rect">
               <a:avLst/>
@@ -23576,7 +23576,7 @@
         <p:spPr>
           <a:xfrm>
             <a:off x="838080" y="365040"/>
-            <a:ext cx="10511280" cy="1321200"/>
+            <a:ext cx="10510920" cy="1320840"/>
           </a:xfrm>
           <a:prstGeom prst="rect">
             <a:avLst/>
@@ -23632,7 +23632,7 @@
         <p:spPr>
           <a:xfrm>
             <a:off x="838080" y="1825560"/>
-            <a:ext cx="10511280" cy="4347000"/>
+            <a:ext cx="10510920" cy="4346640"/>
           </a:xfrm>
           <a:prstGeom prst="rect">
             <a:avLst/>
@@ -23962,7 +23962,7 @@
         <p:spPr>
           <a:xfrm>
             <a:off x="838080" y="365040"/>
-            <a:ext cx="10511280" cy="1321200"/>
+            <a:ext cx="10510920" cy="1320840"/>
           </a:xfrm>
           <a:prstGeom prst="rect">
             <a:avLst/>
@@ -24018,7 +24018,7 @@
         <p:spPr>
           <a:xfrm>
             <a:off x="838080" y="1825560"/>
-            <a:ext cx="8419680" cy="4347000"/>
+            <a:ext cx="8419320" cy="4346640"/>
           </a:xfrm>
           <a:prstGeom prst="rect">
             <a:avLst/>
@@ -24039,12 +24039,43 @@
             <a:normAutofit/>
           </a:bodyPr>
           <a:p>
+            <a:pPr defTabSz="914400">
+              <a:lnSpc>
+                <a:spcPct val="90000"/>
+              </a:lnSpc>
+              <a:spcBef>
+                <a:spcPts val="1001"/>
+              </a:spcBef>
+              <a:spcAft>
+                <a:spcPts val="601"/>
+              </a:spcAft>
+            </a:pPr>
+            <a:r>
+              <a:rPr b="0" lang="en-GB" sz="2800" strike="noStrike" u="none">
+                <a:solidFill>
+                  <a:srgbClr val="ffffff"/>
+                </a:solidFill>
+                <a:uFillTx/>
+                <a:latin typeface="Verdana"/>
+                <a:ea typeface="Verdana"/>
+              </a:rPr>
+              <a:t>Get started with Python in VS Code (w. extensions)</a:t>
+            </a:r>
+            <a:endParaRPr b="0" lang="en-GB" sz="2800" strike="noStrike" u="none">
+              <a:solidFill>
+                <a:srgbClr val="ffffff"/>
+              </a:solidFill>
+              <a:uFillTx/>
+              <a:latin typeface="Arial"/>
+            </a:endParaRPr>
+          </a:p>
+          <a:p>
             <a:pPr marL="228600" indent="-227520" defTabSz="914400">
               <a:lnSpc>
                 <a:spcPct val="90000"/>
               </a:lnSpc>
               <a:spcBef>
-                <a:spcPts val="1001"/>
+                <a:spcPts val="499"/>
               </a:spcBef>
               <a:spcAft>
                 <a:spcPts val="601"/>
@@ -24064,7 +24095,57 @@
                 <a:latin typeface="Verdana"/>
                 <a:ea typeface="Verdana"/>
               </a:rPr>
-              <a:t>Write a program on paper</a:t>
+              <a:t>The programme will prompt the user to input a number</a:t>
+            </a:r>
+            <a:endParaRPr b="0" lang="en-GB" sz="2800" strike="noStrike" u="none">
+              <a:solidFill>
+                <a:srgbClr val="ffffff"/>
+              </a:solidFill>
+              <a:uFillTx/>
+              <a:latin typeface="Arial"/>
+            </a:endParaRPr>
+          </a:p>
+          <a:p>
+            <a:pPr defTabSz="914400">
+              <a:lnSpc>
+                <a:spcPct val="100000"/>
+              </a:lnSpc>
+            </a:pPr>
+            <a:endParaRPr b="0" lang="en-GB" sz="2800" strike="noStrike" u="none">
+              <a:solidFill>
+                <a:srgbClr val="ffffff"/>
+              </a:solidFill>
+              <a:uFillTx/>
+              <a:latin typeface="Arial"/>
+            </a:endParaRPr>
+          </a:p>
+          <a:p>
+            <a:pPr marL="228600" indent="-227520" defTabSz="914400">
+              <a:lnSpc>
+                <a:spcPct val="90000"/>
+              </a:lnSpc>
+              <a:spcBef>
+                <a:spcPts val="1001"/>
+              </a:spcBef>
+              <a:spcAft>
+                <a:spcPts val="601"/>
+              </a:spcAft>
+              <a:buClr>
+                <a:srgbClr val="ffffff"/>
+              </a:buClr>
+              <a:buFont typeface="Arial"/>
+              <a:buChar char="•"/>
+            </a:pPr>
+            <a:r>
+              <a:rPr b="0" lang="en-GB" sz="2800" strike="noStrike" u="none">
+                <a:solidFill>
+                  <a:srgbClr val="ffffff"/>
+                </a:solidFill>
+                <a:uFillTx/>
+                <a:latin typeface="Verdana"/>
+                <a:ea typeface="Verdana"/>
+              </a:rPr>
+              <a:t>The program should output:</a:t>
             </a:r>
             <a:endParaRPr b="0" lang="en-GB" sz="2800" strike="noStrike" u="none">
               <a:solidFill>
@@ -24100,47 +24181,8 @@
                 <a:latin typeface="Verdana"/>
                 <a:ea typeface="Verdana"/>
               </a:rPr>
-              <a:t>The programme will prompt the user to input a number</a:t>
-            </a:r>
-            <a:endParaRPr b="0" lang="en-GB" sz="2800" strike="noStrike" u="none">
-              <a:solidFill>
-                <a:srgbClr val="ffffff"/>
-              </a:solidFill>
-              <a:uFillTx/>
-              <a:latin typeface="Arial"/>
-            </a:endParaRPr>
-          </a:p>
-          <a:p>
-            <a:pPr defTabSz="914400">
-              <a:lnSpc>
-                <a:spcPct val="100000"/>
-              </a:lnSpc>
-            </a:pPr>
-            <a:endParaRPr b="0" lang="en-GB" sz="2800" strike="noStrike" u="none">
-              <a:solidFill>
-                <a:srgbClr val="ffffff"/>
-              </a:solidFill>
-              <a:uFillTx/>
-              <a:latin typeface="Arial"/>
-            </a:endParaRPr>
-          </a:p>
-          <a:p>
-            <a:pPr marL="228600" indent="-227520" defTabSz="914400">
-              <a:lnSpc>
-                <a:spcPct val="90000"/>
-              </a:lnSpc>
-              <a:spcBef>
-                <a:spcPts val="1001"/>
-              </a:spcBef>
-              <a:spcAft>
-                <a:spcPts val="601"/>
-              </a:spcAft>
-              <a:buClr>
-                <a:srgbClr val="ffffff"/>
-              </a:buClr>
-              <a:buFont typeface="Arial"/>
-              <a:buChar char="•"/>
-            </a:pPr>
+              <a:t>“</a:t>
+            </a:r>
             <a:r>
               <a:rPr b="0" lang="en-GB" sz="2800" strike="noStrike" u="none">
                 <a:solidFill>
@@ -24150,7 +24192,7 @@
                 <a:latin typeface="Verdana"/>
                 <a:ea typeface="Verdana"/>
               </a:rPr>
-              <a:t>The program should output:</a:t>
+              <a:t>Positive”, if the number is greater than 0</a:t>
             </a:r>
             <a:endParaRPr b="0" lang="en-GB" sz="2800" strike="noStrike" u="none">
               <a:solidFill>
@@ -24197,7 +24239,7 @@
                 <a:latin typeface="Verdana"/>
                 <a:ea typeface="Verdana"/>
               </a:rPr>
-              <a:t>Positive”, if the number is greater than 0</a:t>
+              <a:t>Negative”, if the number is less than 0</a:t>
             </a:r>
             <a:endParaRPr b="0" lang="en-GB" sz="2800" strike="noStrike" u="none">
               <a:solidFill>
@@ -24244,54 +24286,7 @@
                 <a:latin typeface="Verdana"/>
                 <a:ea typeface="Verdana"/>
               </a:rPr>
-              <a:t>Negative”, if the number is less than 0</a:t>
-            </a:r>
-            <a:endParaRPr b="0" lang="en-GB" sz="2800" strike="noStrike" u="none">
-              <a:solidFill>
-                <a:srgbClr val="ffffff"/>
-              </a:solidFill>
-              <a:uFillTx/>
-              <a:latin typeface="Arial"/>
-            </a:endParaRPr>
-          </a:p>
-          <a:p>
-            <a:pPr lvl="1" marL="685800" indent="-227520" defTabSz="914400">
-              <a:lnSpc>
-                <a:spcPct val="90000"/>
-              </a:lnSpc>
-              <a:spcBef>
-                <a:spcPts val="499"/>
-              </a:spcBef>
-              <a:spcAft>
-                <a:spcPts val="601"/>
-              </a:spcAft>
-              <a:buClr>
-                <a:srgbClr val="ffffff"/>
-              </a:buClr>
-              <a:buFont typeface="Arial"/>
-              <a:buChar char="•"/>
-            </a:pPr>
-            <a:r>
-              <a:rPr b="0" lang="en-GB" sz="2800" strike="noStrike" u="none">
-                <a:solidFill>
-                  <a:srgbClr val="ffffff"/>
-                </a:solidFill>
-                <a:uFillTx/>
-                <a:latin typeface="Verdana"/>
-                <a:ea typeface="Verdana"/>
-              </a:rPr>
-              <a:t>“</a:t>
-            </a:r>
-            <a:r>
-              <a:rPr b="0" lang="en-GB" sz="2800" strike="noStrike" u="none">
-                <a:solidFill>
-                  <a:srgbClr val="ffffff"/>
-                </a:solidFill>
-                <a:uFillTx/>
-                <a:latin typeface="Verdana"/>
-                <a:ea typeface="Verdana"/>
-              </a:rPr>
-              <a:t>Zero”, if the number is 0</a:t>
+              <a:t>Zero”, otherwise (it’s 0)</a:t>
             </a:r>
             <a:endParaRPr b="0" lang="en-GB" sz="2800" strike="noStrike" u="none">
               <a:solidFill>
@@ -24312,9 +24307,9 @@
         <p:grpSpPr>
           <a:xfrm>
             <a:off x="9408960" y="0"/>
-            <a:ext cx="2778480" cy="6853680"/>
+            <a:ext cx="2778120" cy="6853320"/>
             <a:chOff x="9408960" y="0"/>
-            <a:chExt cx="2778480" cy="6853680"/>
+            <a:chExt cx="2778120" cy="6853320"/>
           </a:xfrm>
         </p:grpSpPr>
         <p:sp>
@@ -24326,7 +24321,7 @@
           <p:spPr>
             <a:xfrm>
               <a:off x="9408960" y="0"/>
-              <a:ext cx="2778480" cy="6853680"/>
+              <a:ext cx="2778120" cy="6853320"/>
             </a:xfrm>
             <a:prstGeom prst="rect">
               <a:avLst/>
@@ -24388,7 +24383,7 @@
           <p:spPr>
             <a:xfrm>
               <a:off x="9408960" y="0"/>
-              <a:ext cx="2778480" cy="1559520"/>
+              <a:ext cx="2778120" cy="1559160"/>
             </a:xfrm>
             <a:prstGeom prst="rect">
               <a:avLst/>
@@ -24445,7 +24440,7 @@
         <p:spPr>
           <a:xfrm>
             <a:off x="838080" y="365040"/>
-            <a:ext cx="10511280" cy="1321200"/>
+            <a:ext cx="10510920" cy="1320840"/>
           </a:xfrm>
           <a:prstGeom prst="rect">
             <a:avLst/>
@@ -24501,7 +24496,7 @@
         <p:spPr>
           <a:xfrm>
             <a:off x="838080" y="1825560"/>
-            <a:ext cx="10511280" cy="4347000"/>
+            <a:ext cx="10510920" cy="4346640"/>
           </a:xfrm>
           <a:prstGeom prst="rect">
             <a:avLst/>

</xml_diff>